<commit_message>
Clean up for presentation
Includes a Readme.md to help summarize the results
</commit_message>
<xml_diff>
--- a/COVID in the USA.pptx
+++ b/COVID in the USA.pptx
@@ -233,7 +233,7 @@
           <a:p>
             <a:fld id="{E4560B6B-963E-45AD-B18D-9DA3469D83C9}" type="datetimeFigureOut">
               <a:rPr lang="en-US" smtClean="0"/>
-              <a:t>6/13/2022</a:t>
+              <a:t>6/27/2022</a:t>
             </a:fld>
             <a:endParaRPr lang="en-US"/>
           </a:p>
@@ -398,7 +398,7 @@
           <a:p>
             <a:fld id="{428D2A0D-6B45-4215-8A49-D14849101A69}" type="datetimeFigureOut">
               <a:rPr lang="en-US" smtClean="0"/>
-              <a:t>6/13/2022</a:t>
+              <a:t>6/27/2022</a:t>
             </a:fld>
             <a:endParaRPr lang="en-US"/>
           </a:p>
@@ -1444,7 +1444,7 @@
           <a:p>
             <a:fld id="{8AE1E626-6EB7-4D9A-AD4A-B54D1684CAD1}" type="datetime1">
               <a:rPr lang="en-US" smtClean="0"/>
-              <a:t>6/13/2022</a:t>
+              <a:t>6/27/2022</a:t>
             </a:fld>
             <a:endParaRPr lang="en-US"/>
           </a:p>
@@ -1662,7 +1662,7 @@
           <a:p>
             <a:fld id="{59932EDF-E99E-4C68-AFCB-7A835B309D6D}" type="datetime1">
               <a:rPr lang="en-US" smtClean="0"/>
-              <a:t>6/13/2022</a:t>
+              <a:t>6/27/2022</a:t>
             </a:fld>
             <a:endParaRPr lang="en-US"/>
           </a:p>
@@ -1844,7 +1844,7 @@
           <a:p>
             <a:fld id="{5F82D85F-A551-4C69-800A-8CFFA2306A88}" type="datetime1">
               <a:rPr lang="en-US" smtClean="0"/>
-              <a:t>6/13/2022</a:t>
+              <a:t>6/27/2022</a:t>
             </a:fld>
             <a:endParaRPr lang="en-US"/>
           </a:p>
@@ -2035,7 +2035,7 @@
           <a:p>
             <a:fld id="{3BD24A36-10EA-4DE5-9251-C62AA44714D2}" type="datetime1">
               <a:rPr lang="en-US" smtClean="0"/>
-              <a:t>6/13/2022</a:t>
+              <a:t>6/27/2022</a:t>
             </a:fld>
             <a:endParaRPr lang="en-US"/>
           </a:p>
@@ -2216,7 +2216,7 @@
           <a:p>
             <a:fld id="{45E95A85-13CC-45EA-B1A6-5B8E77AB646B}" type="datetime1">
               <a:rPr lang="en-US" smtClean="0"/>
-              <a:t>6/13/2022</a:t>
+              <a:t>6/27/2022</a:t>
             </a:fld>
             <a:endParaRPr lang="en-US"/>
           </a:p>
@@ -2459,7 +2459,7 @@
           <a:p>
             <a:fld id="{34B71815-F531-4787-BA2A-626422C133AD}" type="datetime1">
               <a:rPr lang="en-US" smtClean="0"/>
-              <a:t>6/13/2022</a:t>
+              <a:t>6/27/2022</a:t>
             </a:fld>
             <a:endParaRPr lang="en-US"/>
           </a:p>
@@ -2734,7 +2734,7 @@
           <a:p>
             <a:fld id="{56C4885B-3C5C-43BB-9862-47948E5DF551}" type="datetime1">
               <a:rPr lang="en-US" smtClean="0"/>
-              <a:t>6/13/2022</a:t>
+              <a:t>6/27/2022</a:t>
             </a:fld>
             <a:endParaRPr lang="en-US"/>
           </a:p>
@@ -3124,7 +3124,7 @@
           <a:p>
             <a:fld id="{9703B6AF-AB61-4D8E-B7B7-705C5ACEBBCC}" type="datetime1">
               <a:rPr lang="en-US" smtClean="0"/>
-              <a:t>6/13/2022</a:t>
+              <a:t>6/27/2022</a:t>
             </a:fld>
             <a:endParaRPr lang="en-US"/>
           </a:p>
@@ -3253,7 +3253,7 @@
           <a:p>
             <a:fld id="{59B3EC9A-B094-4092-8061-75D86CB34931}" type="datetime1">
               <a:rPr lang="en-US" smtClean="0"/>
-              <a:t>6/13/2022</a:t>
+              <a:t>6/27/2022</a:t>
             </a:fld>
             <a:endParaRPr lang="en-US"/>
           </a:p>
@@ -3360,7 +3360,7 @@
           <a:p>
             <a:fld id="{64E1AEED-2323-4359-853E-316DF6600362}" type="datetime1">
               <a:rPr lang="en-US" smtClean="0"/>
-              <a:t>6/13/2022</a:t>
+              <a:t>6/27/2022</a:t>
             </a:fld>
             <a:endParaRPr lang="en-US"/>
           </a:p>
@@ -3633,7 +3633,7 @@
           <a:p>
             <a:fld id="{333AC2DF-F1FD-4724-A563-92BADFC82ECC}" type="datetime1">
               <a:rPr lang="en-US" smtClean="0"/>
-              <a:t>6/13/2022</a:t>
+              <a:t>6/27/2022</a:t>
             </a:fld>
             <a:endParaRPr lang="en-US"/>
           </a:p>
@@ -3970,7 +3970,7 @@
           <a:p>
             <a:fld id="{8D20E2CF-D74B-4B51-899A-DCEA821C90C7}" type="datetime1">
               <a:rPr lang="en-US" smtClean="0"/>
-              <a:t>6/13/2022</a:t>
+              <a:t>6/27/2022</a:t>
             </a:fld>
             <a:endParaRPr lang="en-US"/>
           </a:p>
@@ -11576,7 +11576,7 @@
             <p:ph sz="half" idx="2"/>
           </p:nvPr>
         </p:nvPicPr>
-        <p:blipFill>
+        <p:blipFill rotWithShape="1">
           <a:blip r:embed="rId3">
             <a:extLst>
               <a:ext uri="{28A0092B-C50C-407E-A947-70E740481C1C}">
@@ -11584,14 +11584,13 @@
               </a:ext>
             </a:extLst>
           </a:blip>
-          <a:stretch>
-            <a:fillRect/>
-          </a:stretch>
+          <a:srcRect l="11244" t="10177" b="10177"/>
+          <a:stretch/>
         </p:blipFill>
         <p:spPr>
           <a:xfrm>
-            <a:off x="6197600" y="2068248"/>
-            <a:ext cx="5384800" cy="3589866"/>
+            <a:off x="7143316" y="2433590"/>
+            <a:ext cx="4779332" cy="2859181"/>
           </a:xfrm>
         </p:spPr>
       </p:pic>
@@ -11611,7 +11610,7 @@
             <p:ph sz="half" idx="1"/>
           </p:nvPr>
         </p:nvPicPr>
-        <p:blipFill>
+        <p:blipFill rotWithShape="1">
           <a:blip r:embed="rId4">
             <a:extLst>
               <a:ext uri="{28A0092B-C50C-407E-A947-70E740481C1C}">
@@ -11619,17 +11618,807 @@
               </a:ext>
             </a:extLst>
           </a:blip>
-          <a:stretch>
-            <a:fillRect/>
-          </a:stretch>
+          <a:srcRect l="11583" r="1" b="10177"/>
+          <a:stretch/>
         </p:blipFill>
         <p:spPr>
           <a:xfrm>
-            <a:off x="609600" y="2068248"/>
-            <a:ext cx="5384800" cy="3589866"/>
+            <a:off x="1339700" y="2068248"/>
+            <a:ext cx="4761029" cy="3224523"/>
           </a:xfrm>
         </p:spPr>
       </p:pic>
+      <p:sp>
+        <p:nvSpPr>
+          <p:cNvPr id="2" name="TextBox 1">
+            <a:extLst>
+              <a:ext uri="{FF2B5EF4-FFF2-40B4-BE49-F238E27FC236}">
+                <a16:creationId xmlns:a16="http://schemas.microsoft.com/office/drawing/2014/main" id="{C4171BAD-2698-FDB3-0485-FD31C77AB31F}"/>
+              </a:ext>
+            </a:extLst>
+          </p:cNvPr>
+          <p:cNvSpPr txBox="1"/>
+          <p:nvPr/>
+        </p:nvSpPr>
+        <p:spPr>
+          <a:xfrm>
+            <a:off x="-138225" y="2531653"/>
+            <a:ext cx="1499191" cy="2659382"/>
+          </a:xfrm>
+          <a:prstGeom prst="rect">
+            <a:avLst/>
+          </a:prstGeom>
+          <a:noFill/>
+        </p:spPr>
+        <p:txBody>
+          <a:bodyPr wrap="square" rtlCol="0">
+            <a:spAutoFit/>
+          </a:bodyPr>
+          <a:lstStyle/>
+          <a:p>
+            <a:pPr algn="r">
+              <a:lnSpc>
+                <a:spcPct val="150000"/>
+              </a:lnSpc>
+            </a:pPr>
+            <a:r>
+              <a:rPr lang="en-US" sz="1250" dirty="0">
+                <a:solidFill>
+                  <a:schemeClr val="bg1"/>
+                </a:solidFill>
+              </a:rPr>
+              <a:t>Confirmed</a:t>
+            </a:r>
+          </a:p>
+          <a:p>
+            <a:pPr algn="r">
+              <a:lnSpc>
+                <a:spcPct val="150000"/>
+              </a:lnSpc>
+            </a:pPr>
+            <a:r>
+              <a:rPr lang="en-US" sz="1250" dirty="0">
+                <a:solidFill>
+                  <a:schemeClr val="bg1"/>
+                </a:solidFill>
+              </a:rPr>
+              <a:t>Deaths</a:t>
+            </a:r>
+          </a:p>
+          <a:p>
+            <a:pPr algn="r">
+              <a:lnSpc>
+                <a:spcPct val="150000"/>
+              </a:lnSpc>
+            </a:pPr>
+            <a:r>
+              <a:rPr lang="en-US" sz="1250" dirty="0">
+                <a:solidFill>
+                  <a:schemeClr val="bg1"/>
+                </a:solidFill>
+              </a:rPr>
+              <a:t>Lat</a:t>
+            </a:r>
+          </a:p>
+          <a:p>
+            <a:pPr algn="r">
+              <a:lnSpc>
+                <a:spcPct val="150000"/>
+              </a:lnSpc>
+            </a:pPr>
+            <a:r>
+              <a:rPr lang="en-US" sz="1250" dirty="0">
+                <a:solidFill>
+                  <a:schemeClr val="bg1"/>
+                </a:solidFill>
+              </a:rPr>
+              <a:t>Longitude</a:t>
+            </a:r>
+          </a:p>
+          <a:p>
+            <a:pPr algn="r">
+              <a:lnSpc>
+                <a:spcPct val="150000"/>
+              </a:lnSpc>
+            </a:pPr>
+            <a:r>
+              <a:rPr lang="en-US" sz="1250" dirty="0" err="1">
+                <a:solidFill>
+                  <a:schemeClr val="bg1"/>
+                </a:solidFill>
+              </a:rPr>
+              <a:t>Total_Pop</a:t>
+            </a:r>
+            <a:endParaRPr lang="en-US" sz="1250" dirty="0">
+              <a:solidFill>
+                <a:schemeClr val="bg1"/>
+              </a:solidFill>
+            </a:endParaRPr>
+          </a:p>
+          <a:p>
+            <a:pPr algn="r">
+              <a:lnSpc>
+                <a:spcPct val="150000"/>
+              </a:lnSpc>
+            </a:pPr>
+            <a:r>
+              <a:rPr lang="en-US" sz="1250" dirty="0">
+                <a:solidFill>
+                  <a:schemeClr val="bg1"/>
+                </a:solidFill>
+              </a:rPr>
+              <a:t>Booster</a:t>
+            </a:r>
+            <a:br>
+              <a:rPr lang="en-US" sz="1250" dirty="0">
+                <a:solidFill>
+                  <a:schemeClr val="bg1"/>
+                </a:solidFill>
+              </a:rPr>
+            </a:br>
+            <a:r>
+              <a:rPr lang="en-US" sz="1250" dirty="0" err="1">
+                <a:solidFill>
+                  <a:schemeClr val="bg1"/>
+                </a:solidFill>
+              </a:rPr>
+              <a:t>Booster</a:t>
+            </a:r>
+            <a:r>
+              <a:rPr lang="en-US" sz="1250" dirty="0">
+                <a:solidFill>
+                  <a:schemeClr val="bg1"/>
+                </a:solidFill>
+              </a:rPr>
+              <a:t> pct</a:t>
+            </a:r>
+          </a:p>
+          <a:p>
+            <a:pPr algn="r">
+              <a:lnSpc>
+                <a:spcPct val="150000"/>
+              </a:lnSpc>
+            </a:pPr>
+            <a:r>
+              <a:rPr lang="en-US" sz="1250" dirty="0">
+                <a:solidFill>
+                  <a:schemeClr val="bg1"/>
+                </a:solidFill>
+              </a:rPr>
+              <a:t>Complete</a:t>
+            </a:r>
+          </a:p>
+          <a:p>
+            <a:pPr algn="r">
+              <a:lnSpc>
+                <a:spcPct val="150000"/>
+              </a:lnSpc>
+            </a:pPr>
+            <a:r>
+              <a:rPr lang="en-US" sz="1250" dirty="0">
+                <a:solidFill>
+                  <a:schemeClr val="bg1"/>
+                </a:solidFill>
+              </a:rPr>
+              <a:t>Complete pct</a:t>
+            </a:r>
+          </a:p>
+        </p:txBody>
+      </p:sp>
+      <p:sp>
+        <p:nvSpPr>
+          <p:cNvPr id="6" name="TextBox 5">
+            <a:extLst>
+              <a:ext uri="{FF2B5EF4-FFF2-40B4-BE49-F238E27FC236}">
+                <a16:creationId xmlns:a16="http://schemas.microsoft.com/office/drawing/2014/main" id="{8C53E858-7094-1C24-0BB1-DC2C0B2264FC}"/>
+              </a:ext>
+            </a:extLst>
+          </p:cNvPr>
+          <p:cNvSpPr txBox="1"/>
+          <p:nvPr/>
+        </p:nvSpPr>
+        <p:spPr>
+          <a:xfrm rot="16200000">
+            <a:off x="2519210" y="4122433"/>
+            <a:ext cx="1022139" cy="3364639"/>
+          </a:xfrm>
+          <a:prstGeom prst="rect">
+            <a:avLst/>
+          </a:prstGeom>
+          <a:noFill/>
+        </p:spPr>
+        <p:txBody>
+          <a:bodyPr wrap="none" rtlCol="0">
+            <a:spAutoFit/>
+          </a:bodyPr>
+          <a:lstStyle/>
+          <a:p>
+            <a:pPr algn="r">
+              <a:lnSpc>
+                <a:spcPct val="200000"/>
+              </a:lnSpc>
+            </a:pPr>
+            <a:r>
+              <a:rPr lang="en-US" sz="1200" dirty="0">
+                <a:solidFill>
+                  <a:schemeClr val="bg1"/>
+                </a:solidFill>
+              </a:rPr>
+              <a:t>Confirmed</a:t>
+            </a:r>
+          </a:p>
+          <a:p>
+            <a:pPr algn="r">
+              <a:lnSpc>
+                <a:spcPct val="200000"/>
+              </a:lnSpc>
+            </a:pPr>
+            <a:r>
+              <a:rPr lang="en-US" sz="1200" dirty="0">
+                <a:solidFill>
+                  <a:schemeClr val="bg1"/>
+                </a:solidFill>
+              </a:rPr>
+              <a:t>Deaths</a:t>
+            </a:r>
+          </a:p>
+          <a:p>
+            <a:pPr algn="r">
+              <a:lnSpc>
+                <a:spcPct val="200000"/>
+              </a:lnSpc>
+            </a:pPr>
+            <a:r>
+              <a:rPr lang="en-US" sz="1200" dirty="0">
+                <a:solidFill>
+                  <a:schemeClr val="bg1"/>
+                </a:solidFill>
+              </a:rPr>
+              <a:t>Lat</a:t>
+            </a:r>
+          </a:p>
+          <a:p>
+            <a:pPr algn="r">
+              <a:lnSpc>
+                <a:spcPct val="200000"/>
+              </a:lnSpc>
+            </a:pPr>
+            <a:r>
+              <a:rPr lang="en-US" sz="1200" dirty="0">
+                <a:solidFill>
+                  <a:schemeClr val="bg1"/>
+                </a:solidFill>
+              </a:rPr>
+              <a:t>Longitude</a:t>
+            </a:r>
+          </a:p>
+          <a:p>
+            <a:pPr algn="r">
+              <a:lnSpc>
+                <a:spcPct val="200000"/>
+              </a:lnSpc>
+            </a:pPr>
+            <a:r>
+              <a:rPr lang="en-US" sz="1200" dirty="0" err="1">
+                <a:solidFill>
+                  <a:schemeClr val="bg1"/>
+                </a:solidFill>
+              </a:rPr>
+              <a:t>Total_Pop</a:t>
+            </a:r>
+            <a:endParaRPr lang="en-US" sz="1200" dirty="0">
+              <a:solidFill>
+                <a:schemeClr val="bg1"/>
+              </a:solidFill>
+            </a:endParaRPr>
+          </a:p>
+          <a:p>
+            <a:pPr algn="r">
+              <a:lnSpc>
+                <a:spcPct val="200000"/>
+              </a:lnSpc>
+            </a:pPr>
+            <a:r>
+              <a:rPr lang="en-US" sz="1200" dirty="0">
+                <a:solidFill>
+                  <a:schemeClr val="bg1"/>
+                </a:solidFill>
+              </a:rPr>
+              <a:t>Booster</a:t>
+            </a:r>
+            <a:br>
+              <a:rPr lang="en-US" sz="1200" dirty="0">
+                <a:solidFill>
+                  <a:schemeClr val="bg1"/>
+                </a:solidFill>
+              </a:rPr>
+            </a:br>
+            <a:r>
+              <a:rPr lang="en-US" sz="1200" dirty="0" err="1">
+                <a:solidFill>
+                  <a:schemeClr val="bg1"/>
+                </a:solidFill>
+              </a:rPr>
+              <a:t>Booster</a:t>
+            </a:r>
+            <a:r>
+              <a:rPr lang="en-US" sz="1200" dirty="0">
+                <a:solidFill>
+                  <a:schemeClr val="bg1"/>
+                </a:solidFill>
+              </a:rPr>
+              <a:t> pct</a:t>
+            </a:r>
+          </a:p>
+          <a:p>
+            <a:pPr algn="r">
+              <a:lnSpc>
+                <a:spcPct val="200000"/>
+              </a:lnSpc>
+            </a:pPr>
+            <a:r>
+              <a:rPr lang="en-US" sz="1200" dirty="0">
+                <a:solidFill>
+                  <a:schemeClr val="bg1"/>
+                </a:solidFill>
+              </a:rPr>
+              <a:t>Complete</a:t>
+            </a:r>
+          </a:p>
+          <a:p>
+            <a:pPr algn="r">
+              <a:lnSpc>
+                <a:spcPct val="200000"/>
+              </a:lnSpc>
+            </a:pPr>
+            <a:r>
+              <a:rPr lang="en-US" sz="1200" dirty="0">
+                <a:solidFill>
+                  <a:schemeClr val="bg1"/>
+                </a:solidFill>
+              </a:rPr>
+              <a:t>Complete pct</a:t>
+            </a:r>
+          </a:p>
+        </p:txBody>
+      </p:sp>
+      <p:sp>
+        <p:nvSpPr>
+          <p:cNvPr id="7" name="TextBox 6">
+            <a:extLst>
+              <a:ext uri="{FF2B5EF4-FFF2-40B4-BE49-F238E27FC236}">
+                <a16:creationId xmlns:a16="http://schemas.microsoft.com/office/drawing/2014/main" id="{7606E456-87BD-3443-D948-29E005708B15}"/>
+              </a:ext>
+            </a:extLst>
+          </p:cNvPr>
+          <p:cNvSpPr txBox="1"/>
+          <p:nvPr/>
+        </p:nvSpPr>
+        <p:spPr>
+          <a:xfrm>
+            <a:off x="5644125" y="2433590"/>
+            <a:ext cx="1499191" cy="2859181"/>
+          </a:xfrm>
+          <a:prstGeom prst="rect">
+            <a:avLst/>
+          </a:prstGeom>
+          <a:noFill/>
+        </p:spPr>
+        <p:txBody>
+          <a:bodyPr wrap="square" rtlCol="0">
+            <a:spAutoFit/>
+          </a:bodyPr>
+          <a:lstStyle/>
+          <a:p>
+            <a:pPr algn="r">
+              <a:lnSpc>
+                <a:spcPct val="150000"/>
+              </a:lnSpc>
+            </a:pPr>
+            <a:r>
+              <a:rPr lang="en-US" sz="1100" dirty="0">
+                <a:solidFill>
+                  <a:schemeClr val="bg1"/>
+                </a:solidFill>
+              </a:rPr>
+              <a:t>Confirmed</a:t>
+            </a:r>
+          </a:p>
+          <a:p>
+            <a:pPr algn="r">
+              <a:lnSpc>
+                <a:spcPct val="150000"/>
+              </a:lnSpc>
+            </a:pPr>
+            <a:r>
+              <a:rPr lang="en-US" sz="1100" dirty="0">
+                <a:solidFill>
+                  <a:schemeClr val="bg1"/>
+                </a:solidFill>
+              </a:rPr>
+              <a:t>Deaths</a:t>
+            </a:r>
+          </a:p>
+          <a:p>
+            <a:pPr algn="r">
+              <a:lnSpc>
+                <a:spcPct val="150000"/>
+              </a:lnSpc>
+            </a:pPr>
+            <a:r>
+              <a:rPr lang="en-US" sz="1100" dirty="0">
+                <a:solidFill>
+                  <a:schemeClr val="bg1"/>
+                </a:solidFill>
+              </a:rPr>
+              <a:t>Lat</a:t>
+            </a:r>
+          </a:p>
+          <a:p>
+            <a:pPr algn="r">
+              <a:lnSpc>
+                <a:spcPct val="150000"/>
+              </a:lnSpc>
+            </a:pPr>
+            <a:r>
+              <a:rPr lang="en-US" sz="1100" dirty="0">
+                <a:solidFill>
+                  <a:schemeClr val="bg1"/>
+                </a:solidFill>
+              </a:rPr>
+              <a:t>Longitude</a:t>
+            </a:r>
+          </a:p>
+          <a:p>
+            <a:pPr algn="r">
+              <a:lnSpc>
+                <a:spcPct val="150000"/>
+              </a:lnSpc>
+            </a:pPr>
+            <a:r>
+              <a:rPr lang="en-US" sz="1100" dirty="0" err="1">
+                <a:solidFill>
+                  <a:schemeClr val="bg1"/>
+                </a:solidFill>
+              </a:rPr>
+              <a:t>Total_Pop</a:t>
+            </a:r>
+            <a:endParaRPr lang="en-US" sz="1100" dirty="0">
+              <a:solidFill>
+                <a:schemeClr val="bg1"/>
+              </a:solidFill>
+            </a:endParaRPr>
+          </a:p>
+          <a:p>
+            <a:pPr algn="r">
+              <a:lnSpc>
+                <a:spcPct val="150000"/>
+              </a:lnSpc>
+            </a:pPr>
+            <a:r>
+              <a:rPr lang="en-US" sz="1100" dirty="0">
+                <a:solidFill>
+                  <a:schemeClr val="bg1"/>
+                </a:solidFill>
+              </a:rPr>
+              <a:t>Booster</a:t>
+            </a:r>
+            <a:br>
+              <a:rPr lang="en-US" sz="1100" dirty="0">
+                <a:solidFill>
+                  <a:schemeClr val="bg1"/>
+                </a:solidFill>
+              </a:rPr>
+            </a:br>
+            <a:r>
+              <a:rPr lang="en-US" sz="1100" dirty="0">
+                <a:solidFill>
+                  <a:schemeClr val="bg1"/>
+                </a:solidFill>
+              </a:rPr>
+              <a:t>Complete</a:t>
+            </a:r>
+          </a:p>
+          <a:p>
+            <a:pPr algn="r">
+              <a:lnSpc>
+                <a:spcPct val="150000"/>
+              </a:lnSpc>
+            </a:pPr>
+            <a:r>
+              <a:rPr lang="en-US" sz="1100" dirty="0">
+                <a:solidFill>
+                  <a:schemeClr val="bg1"/>
+                </a:solidFill>
+              </a:rPr>
+              <a:t>Confirmed Pct</a:t>
+            </a:r>
+          </a:p>
+          <a:p>
+            <a:pPr algn="r">
+              <a:lnSpc>
+                <a:spcPct val="150000"/>
+              </a:lnSpc>
+            </a:pPr>
+            <a:r>
+              <a:rPr lang="en-US" sz="1100" dirty="0">
+                <a:solidFill>
+                  <a:schemeClr val="bg1"/>
+                </a:solidFill>
+              </a:rPr>
+              <a:t>Deaths Pct</a:t>
+            </a:r>
+          </a:p>
+          <a:p>
+            <a:pPr algn="r">
+              <a:lnSpc>
+                <a:spcPct val="150000"/>
+              </a:lnSpc>
+            </a:pPr>
+            <a:r>
+              <a:rPr lang="en-US" sz="1100" dirty="0">
+                <a:solidFill>
+                  <a:schemeClr val="bg1"/>
+                </a:solidFill>
+              </a:rPr>
+              <a:t>Booster Pct</a:t>
+            </a:r>
+          </a:p>
+          <a:p>
+            <a:pPr algn="r">
+              <a:lnSpc>
+                <a:spcPct val="150000"/>
+              </a:lnSpc>
+            </a:pPr>
+            <a:r>
+              <a:rPr lang="en-US" sz="1100" dirty="0">
+                <a:solidFill>
+                  <a:schemeClr val="bg1"/>
+                </a:solidFill>
+              </a:rPr>
+              <a:t>Complete Pct</a:t>
+            </a:r>
+          </a:p>
+        </p:txBody>
+      </p:sp>
+      <p:sp>
+        <p:nvSpPr>
+          <p:cNvPr id="8" name="TextBox 7">
+            <a:extLst>
+              <a:ext uri="{FF2B5EF4-FFF2-40B4-BE49-F238E27FC236}">
+                <a16:creationId xmlns:a16="http://schemas.microsoft.com/office/drawing/2014/main" id="{8807A27D-98F6-E3AD-C891-8643D8C7AC9E}"/>
+              </a:ext>
+            </a:extLst>
+          </p:cNvPr>
+          <p:cNvSpPr txBox="1"/>
+          <p:nvPr/>
+        </p:nvSpPr>
+        <p:spPr>
+          <a:xfrm rot="16200000">
+            <a:off x="8123097" y="4230792"/>
+            <a:ext cx="1499191" cy="3601883"/>
+          </a:xfrm>
+          <a:prstGeom prst="rect">
+            <a:avLst/>
+          </a:prstGeom>
+          <a:noFill/>
+        </p:spPr>
+        <p:txBody>
+          <a:bodyPr wrap="square" rtlCol="0">
+            <a:spAutoFit/>
+          </a:bodyPr>
+          <a:lstStyle/>
+          <a:p>
+            <a:pPr algn="r">
+              <a:lnSpc>
+                <a:spcPct val="200000"/>
+              </a:lnSpc>
+            </a:pPr>
+            <a:r>
+              <a:rPr lang="en-US" sz="1050" dirty="0">
+                <a:solidFill>
+                  <a:schemeClr val="bg1"/>
+                </a:solidFill>
+              </a:rPr>
+              <a:t>Confirmed</a:t>
+            </a:r>
+          </a:p>
+          <a:p>
+            <a:pPr algn="r">
+              <a:lnSpc>
+                <a:spcPct val="200000"/>
+              </a:lnSpc>
+            </a:pPr>
+            <a:r>
+              <a:rPr lang="en-US" sz="1050" dirty="0">
+                <a:solidFill>
+                  <a:schemeClr val="bg1"/>
+                </a:solidFill>
+              </a:rPr>
+              <a:t>Deaths</a:t>
+            </a:r>
+          </a:p>
+          <a:p>
+            <a:pPr algn="r">
+              <a:lnSpc>
+                <a:spcPct val="200000"/>
+              </a:lnSpc>
+            </a:pPr>
+            <a:r>
+              <a:rPr lang="en-US" sz="1050" dirty="0">
+                <a:solidFill>
+                  <a:schemeClr val="bg1"/>
+                </a:solidFill>
+              </a:rPr>
+              <a:t>Lat</a:t>
+            </a:r>
+          </a:p>
+          <a:p>
+            <a:pPr algn="r">
+              <a:lnSpc>
+                <a:spcPct val="200000"/>
+              </a:lnSpc>
+            </a:pPr>
+            <a:r>
+              <a:rPr lang="en-US" sz="1050" dirty="0">
+                <a:solidFill>
+                  <a:schemeClr val="bg1"/>
+                </a:solidFill>
+              </a:rPr>
+              <a:t>Longitude</a:t>
+            </a:r>
+          </a:p>
+          <a:p>
+            <a:pPr algn="r">
+              <a:lnSpc>
+                <a:spcPct val="200000"/>
+              </a:lnSpc>
+            </a:pPr>
+            <a:r>
+              <a:rPr lang="en-US" sz="1050" dirty="0" err="1">
+                <a:solidFill>
+                  <a:schemeClr val="bg1"/>
+                </a:solidFill>
+              </a:rPr>
+              <a:t>Total_Pop</a:t>
+            </a:r>
+            <a:endParaRPr lang="en-US" sz="1050" dirty="0">
+              <a:solidFill>
+                <a:schemeClr val="bg1"/>
+              </a:solidFill>
+            </a:endParaRPr>
+          </a:p>
+          <a:p>
+            <a:pPr algn="r">
+              <a:lnSpc>
+                <a:spcPct val="200000"/>
+              </a:lnSpc>
+            </a:pPr>
+            <a:r>
+              <a:rPr lang="en-US" sz="1050" dirty="0">
+                <a:solidFill>
+                  <a:schemeClr val="bg1"/>
+                </a:solidFill>
+              </a:rPr>
+              <a:t>Booster</a:t>
+            </a:r>
+            <a:br>
+              <a:rPr lang="en-US" sz="1050" dirty="0">
+                <a:solidFill>
+                  <a:schemeClr val="bg1"/>
+                </a:solidFill>
+              </a:rPr>
+            </a:br>
+            <a:r>
+              <a:rPr lang="en-US" sz="1050" dirty="0">
+                <a:solidFill>
+                  <a:schemeClr val="bg1"/>
+                </a:solidFill>
+              </a:rPr>
+              <a:t>Complete</a:t>
+            </a:r>
+          </a:p>
+          <a:p>
+            <a:pPr algn="r">
+              <a:lnSpc>
+                <a:spcPct val="200000"/>
+              </a:lnSpc>
+            </a:pPr>
+            <a:r>
+              <a:rPr lang="en-US" sz="1050" dirty="0">
+                <a:solidFill>
+                  <a:schemeClr val="bg1"/>
+                </a:solidFill>
+              </a:rPr>
+              <a:t>Confirmed Pct</a:t>
+            </a:r>
+          </a:p>
+          <a:p>
+            <a:pPr algn="r">
+              <a:lnSpc>
+                <a:spcPct val="200000"/>
+              </a:lnSpc>
+            </a:pPr>
+            <a:r>
+              <a:rPr lang="en-US" sz="1050" dirty="0">
+                <a:solidFill>
+                  <a:schemeClr val="bg1"/>
+                </a:solidFill>
+              </a:rPr>
+              <a:t>Deaths Pct</a:t>
+            </a:r>
+          </a:p>
+          <a:p>
+            <a:pPr algn="r">
+              <a:lnSpc>
+                <a:spcPct val="200000"/>
+              </a:lnSpc>
+            </a:pPr>
+            <a:r>
+              <a:rPr lang="en-US" sz="1050" dirty="0">
+                <a:solidFill>
+                  <a:schemeClr val="bg1"/>
+                </a:solidFill>
+              </a:rPr>
+              <a:t>Booster Pct</a:t>
+            </a:r>
+          </a:p>
+          <a:p>
+            <a:pPr algn="r">
+              <a:lnSpc>
+                <a:spcPct val="200000"/>
+              </a:lnSpc>
+            </a:pPr>
+            <a:r>
+              <a:rPr lang="en-US" sz="1050" dirty="0">
+                <a:solidFill>
+                  <a:schemeClr val="bg1"/>
+                </a:solidFill>
+              </a:rPr>
+              <a:t>Complete Pct</a:t>
+            </a:r>
+          </a:p>
+        </p:txBody>
+      </p:sp>
+      <p:sp>
+        <p:nvSpPr>
+          <p:cNvPr id="3" name="TextBox 2">
+            <a:extLst>
+              <a:ext uri="{FF2B5EF4-FFF2-40B4-BE49-F238E27FC236}">
+                <a16:creationId xmlns:a16="http://schemas.microsoft.com/office/drawing/2014/main" id="{7BD00044-7CFD-5BF3-BCB9-9E7A26E4FA40}"/>
+              </a:ext>
+            </a:extLst>
+          </p:cNvPr>
+          <p:cNvSpPr txBox="1"/>
+          <p:nvPr/>
+        </p:nvSpPr>
+        <p:spPr>
+          <a:xfrm>
+            <a:off x="7947378" y="2190046"/>
+            <a:ext cx="1706429" cy="307777"/>
+          </a:xfrm>
+          <a:prstGeom prst="rect">
+            <a:avLst/>
+          </a:prstGeom>
+          <a:noFill/>
+        </p:spPr>
+        <p:txBody>
+          <a:bodyPr wrap="none" rtlCol="0">
+            <a:spAutoFit/>
+          </a:bodyPr>
+          <a:lstStyle/>
+          <a:p>
+            <a:r>
+              <a:rPr lang="en-US" sz="1400" dirty="0">
+                <a:solidFill>
+                  <a:schemeClr val="bg1"/>
+                </a:solidFill>
+              </a:rPr>
+              <a:t>Correlations by State</a:t>
+            </a:r>
+          </a:p>
+        </p:txBody>
+      </p:sp>
     </p:spTree>
     <p:extLst>
       <p:ext uri="{BB962C8B-B14F-4D97-AF65-F5344CB8AC3E}">
@@ -14859,7 +15648,7 @@
         </p:nvSpPr>
         <p:spPr>
           <a:xfrm>
-            <a:off x="2209800" y="1163638"/>
+            <a:off x="2209800" y="1417638"/>
             <a:ext cx="7772400" cy="5440362"/>
           </a:xfrm>
         </p:spPr>
@@ -15252,119 +16041,6 @@
                 </a:solidFill>
               </a:rPr>
               <a:t>Sigma2	2.19e+06    	678.998   	3225.552      0.000    	2.19e+06    	2.19e+06</a:t>
-            </a:r>
-          </a:p>
-          <a:p>
-            <a:pPr marL="137160" indent="0">
-              <a:buNone/>
-            </a:pPr>
-            <a:r>
-              <a:rPr lang="en-US" sz="5600" dirty="0">
-                <a:solidFill>
-                  <a:schemeClr val="bg1">
-                    <a:lumMod val="85000"/>
-                    <a:lumOff val="15000"/>
-                  </a:schemeClr>
-                </a:solidFill>
-              </a:rPr>
-              <a:t>===================================================================================</a:t>
-            </a:r>
-          </a:p>
-          <a:p>
-            <a:pPr marL="137160" indent="0">
-              <a:buNone/>
-            </a:pPr>
-            <a:r>
-              <a:rPr lang="en-US" sz="5600" dirty="0" err="1">
-                <a:solidFill>
-                  <a:schemeClr val="bg1">
-                    <a:lumMod val="85000"/>
-                    <a:lumOff val="15000"/>
-                  </a:schemeClr>
-                </a:solidFill>
-              </a:rPr>
-              <a:t>Ljung</a:t>
-            </a:r>
-            <a:r>
-              <a:rPr lang="en-US" sz="5600" dirty="0">
-                <a:solidFill>
-                  <a:schemeClr val="bg1">
-                    <a:lumMod val="85000"/>
-                    <a:lumOff val="15000"/>
-                  </a:schemeClr>
-                </a:solidFill>
-              </a:rPr>
-              <a:t>-Box (L1) (Q):                   0.72     			Jarque-</a:t>
-            </a:r>
-            <a:r>
-              <a:rPr lang="en-US" sz="5600" dirty="0" err="1">
-                <a:solidFill>
-                  <a:schemeClr val="bg1">
-                    <a:lumMod val="85000"/>
-                    <a:lumOff val="15000"/>
-                  </a:schemeClr>
-                </a:solidFill>
-              </a:rPr>
-              <a:t>Bera</a:t>
-            </a:r>
-            <a:r>
-              <a:rPr lang="en-US" sz="5600" dirty="0">
-                <a:solidFill>
-                  <a:schemeClr val="bg1">
-                    <a:lumMod val="85000"/>
-                    <a:lumOff val="15000"/>
-                  </a:schemeClr>
-                </a:solidFill>
-              </a:rPr>
-              <a:t> (JB):          139486.43</a:t>
-            </a:r>
-          </a:p>
-          <a:p>
-            <a:pPr marL="137160" indent="0">
-              <a:buNone/>
-            </a:pPr>
-            <a:r>
-              <a:rPr lang="en-US" sz="5600" dirty="0">
-                <a:solidFill>
-                  <a:schemeClr val="bg1">
-                    <a:lumMod val="85000"/>
-                    <a:lumOff val="15000"/>
-                  </a:schemeClr>
-                </a:solidFill>
-              </a:rPr>
-              <a:t>Prob(Q):                                     0.40     			Prob(JB):                        0.00</a:t>
-            </a:r>
-          </a:p>
-          <a:p>
-            <a:pPr marL="137160" indent="0">
-              <a:buNone/>
-            </a:pPr>
-            <a:r>
-              <a:rPr lang="en-US" sz="5600" dirty="0">
-                <a:solidFill>
-                  <a:schemeClr val="bg1">
-                    <a:lumMod val="85000"/>
-                    <a:lumOff val="15000"/>
-                  </a:schemeClr>
-                </a:solidFill>
-              </a:rPr>
-              <a:t>Heteroskedasticity (H):           72.79   		Skew:                             1.99</a:t>
-            </a:r>
-          </a:p>
-          <a:p>
-            <a:pPr marL="137160" indent="0">
-              <a:buNone/>
-            </a:pPr>
-            <a:r>
-              <a:rPr lang="en-US" sz="5600" dirty="0">
-                <a:solidFill>
-                  <a:schemeClr val="bg1">
-                    <a:lumMod val="85000"/>
-                    <a:lumOff val="15000"/>
-                  </a:schemeClr>
-                </a:solidFill>
-              </a:rPr>
-              <a:t>Prob(H) (two-sided):                0.00     		Kurtosis:                        70.46</a:t>
             </a:r>
           </a:p>
           <a:p>
@@ -25372,12 +26048,129 @@
 </file>
 
 <file path=customXml/item1.xml><?xml version="1.0" encoding="utf-8"?>
-<?mso-contentType ?>
-<FormTemplates xmlns="http://schemas.microsoft.com/sharepoint/v3/contenttype/forms">
-  <Display>DocumentLibraryForm</Display>
-  <Edit>AssetEditForm</Edit>
-  <New>DocumentLibraryForm</New>
-</FormTemplates>
+<p:properties xmlns:p="http://schemas.microsoft.com/office/2006/metadata/properties" xmlns:xsi="http://www.w3.org/2001/XMLSchema-instance" xmlns:pc="http://schemas.microsoft.com/office/infopath/2007/PartnerControls">
+  <documentManagement>
+    <APDescription xmlns="4873beb7-5857-4685-be1f-d57550cc96cc" xsi:nil="true"/>
+    <AssetExpire xmlns="4873beb7-5857-4685-be1f-d57550cc96cc">2029-01-01T08:00:00+00:00</AssetExpire>
+    <CampaignTagsTaxHTField0 xmlns="4873beb7-5857-4685-be1f-d57550cc96cc">
+      <Terms xmlns="http://schemas.microsoft.com/office/infopath/2007/PartnerControls"/>
+    </CampaignTagsTaxHTField0>
+    <IntlLangReviewDate xmlns="4873beb7-5857-4685-be1f-d57550cc96cc" xsi:nil="true"/>
+    <TPFriendlyName xmlns="4873beb7-5857-4685-be1f-d57550cc96cc" xsi:nil="true"/>
+    <IntlLangReview xmlns="4873beb7-5857-4685-be1f-d57550cc96cc">false</IntlLangReview>
+    <LocLastLocAttemptVersionLookup xmlns="4873beb7-5857-4685-be1f-d57550cc96cc">856783</LocLastLocAttemptVersionLookup>
+    <PolicheckWords xmlns="4873beb7-5857-4685-be1f-d57550cc96cc" xsi:nil="true"/>
+    <SubmitterId xmlns="4873beb7-5857-4685-be1f-d57550cc96cc" xsi:nil="true"/>
+    <AcquiredFrom xmlns="4873beb7-5857-4685-be1f-d57550cc96cc">Internal MS</AcquiredFrom>
+    <EditorialStatus xmlns="4873beb7-5857-4685-be1f-d57550cc96cc">Complete</EditorialStatus>
+    <Markets xmlns="4873beb7-5857-4685-be1f-d57550cc96cc"/>
+    <OriginAsset xmlns="4873beb7-5857-4685-be1f-d57550cc96cc" xsi:nil="true"/>
+    <AssetStart xmlns="4873beb7-5857-4685-be1f-d57550cc96cc">2012-09-20T10:48:20+00:00</AssetStart>
+    <FriendlyTitle xmlns="4873beb7-5857-4685-be1f-d57550cc96cc" xsi:nil="true"/>
+    <MarketSpecific xmlns="4873beb7-5857-4685-be1f-d57550cc96cc">false</MarketSpecific>
+    <TPNamespace xmlns="4873beb7-5857-4685-be1f-d57550cc96cc" xsi:nil="true"/>
+    <PublishStatusLookup xmlns="4873beb7-5857-4685-be1f-d57550cc96cc">
+      <Value>1622871</Value>
+    </PublishStatusLookup>
+    <APAuthor xmlns="4873beb7-5857-4685-be1f-d57550cc96cc">
+      <UserInfo>
+        <DisplayName>REDMOND\v-luannv</DisplayName>
+        <AccountId>92</AccountId>
+        <AccountType/>
+      </UserInfo>
+    </APAuthor>
+    <TPCommandLine xmlns="4873beb7-5857-4685-be1f-d57550cc96cc" xsi:nil="true"/>
+    <IntlLangReviewer xmlns="4873beb7-5857-4685-be1f-d57550cc96cc" xsi:nil="true"/>
+    <OpenTemplate xmlns="4873beb7-5857-4685-be1f-d57550cc96cc">true</OpenTemplate>
+    <CSXSubmissionDate xmlns="4873beb7-5857-4685-be1f-d57550cc96cc" xsi:nil="true"/>
+    <TaxCatchAll xmlns="4873beb7-5857-4685-be1f-d57550cc96cc"/>
+    <Manager xmlns="4873beb7-5857-4685-be1f-d57550cc96cc" xsi:nil="true"/>
+    <NumericId xmlns="4873beb7-5857-4685-be1f-d57550cc96cc" xsi:nil="true"/>
+    <ParentAssetId xmlns="4873beb7-5857-4685-be1f-d57550cc96cc" xsi:nil="true"/>
+    <OriginalSourceMarket xmlns="4873beb7-5857-4685-be1f-d57550cc96cc" xsi:nil="true"/>
+    <ApprovalStatus xmlns="4873beb7-5857-4685-be1f-d57550cc96cc">InProgress</ApprovalStatus>
+    <TPComponent xmlns="4873beb7-5857-4685-be1f-d57550cc96cc" xsi:nil="true"/>
+    <EditorialTags xmlns="4873beb7-5857-4685-be1f-d57550cc96cc" xsi:nil="true"/>
+    <TPExecutable xmlns="4873beb7-5857-4685-be1f-d57550cc96cc" xsi:nil="true"/>
+    <TPLaunchHelpLink xmlns="4873beb7-5857-4685-be1f-d57550cc96cc" xsi:nil="true"/>
+    <LocComments xmlns="4873beb7-5857-4685-be1f-d57550cc96cc" xsi:nil="true"/>
+    <LocRecommendedHandoff xmlns="4873beb7-5857-4685-be1f-d57550cc96cc" xsi:nil="true"/>
+    <SourceTitle xmlns="4873beb7-5857-4685-be1f-d57550cc96cc" xsi:nil="true"/>
+    <CSXUpdate xmlns="4873beb7-5857-4685-be1f-d57550cc96cc">false</CSXUpdate>
+    <IntlLocPriority xmlns="4873beb7-5857-4685-be1f-d57550cc96cc" xsi:nil="true"/>
+    <UAProjectedTotalWords xmlns="4873beb7-5857-4685-be1f-d57550cc96cc" xsi:nil="true"/>
+    <AssetType xmlns="4873beb7-5857-4685-be1f-d57550cc96cc" xsi:nil="true"/>
+    <MachineTranslated xmlns="4873beb7-5857-4685-be1f-d57550cc96cc">false</MachineTranslated>
+    <OutputCachingOn xmlns="4873beb7-5857-4685-be1f-d57550cc96cc">false</OutputCachingOn>
+    <TemplateStatus xmlns="4873beb7-5857-4685-be1f-d57550cc96cc">Complete</TemplateStatus>
+    <IsSearchable xmlns="4873beb7-5857-4685-be1f-d57550cc96cc">false</IsSearchable>
+    <ContentItem xmlns="4873beb7-5857-4685-be1f-d57550cc96cc" xsi:nil="true"/>
+    <HandoffToMSDN xmlns="4873beb7-5857-4685-be1f-d57550cc96cc" xsi:nil="true"/>
+    <ShowIn xmlns="4873beb7-5857-4685-be1f-d57550cc96cc">Show everywhere</ShowIn>
+    <ThumbnailAssetId xmlns="4873beb7-5857-4685-be1f-d57550cc96cc" xsi:nil="true"/>
+    <UALocComments xmlns="4873beb7-5857-4685-be1f-d57550cc96cc" xsi:nil="true"/>
+    <UALocRecommendation xmlns="4873beb7-5857-4685-be1f-d57550cc96cc">Localize</UALocRecommendation>
+    <LastModifiedDateTime xmlns="4873beb7-5857-4685-be1f-d57550cc96cc" xsi:nil="true"/>
+    <LegacyData xmlns="4873beb7-5857-4685-be1f-d57550cc96cc" xsi:nil="true"/>
+    <LocManualTestRequired xmlns="4873beb7-5857-4685-be1f-d57550cc96cc">false</LocManualTestRequired>
+    <LocMarketGroupTiers2 xmlns="4873beb7-5857-4685-be1f-d57550cc96cc" xsi:nil="true"/>
+    <ClipArtFilename xmlns="4873beb7-5857-4685-be1f-d57550cc96cc" xsi:nil="true"/>
+    <TPApplication xmlns="4873beb7-5857-4685-be1f-d57550cc96cc" xsi:nil="true"/>
+    <CSXHash xmlns="4873beb7-5857-4685-be1f-d57550cc96cc" xsi:nil="true"/>
+    <DirectSourceMarket xmlns="4873beb7-5857-4685-be1f-d57550cc96cc" xsi:nil="true"/>
+    <PrimaryImageGen xmlns="4873beb7-5857-4685-be1f-d57550cc96cc">true</PrimaryImageGen>
+    <PlannedPubDate xmlns="4873beb7-5857-4685-be1f-d57550cc96cc" xsi:nil="true"/>
+    <CSXSubmissionMarket xmlns="4873beb7-5857-4685-be1f-d57550cc96cc" xsi:nil="true"/>
+    <Downloads xmlns="4873beb7-5857-4685-be1f-d57550cc96cc">0</Downloads>
+    <ArtSampleDocs xmlns="4873beb7-5857-4685-be1f-d57550cc96cc" xsi:nil="true"/>
+    <TrustLevel xmlns="4873beb7-5857-4685-be1f-d57550cc96cc">1 Microsoft Managed Content</TrustLevel>
+    <BlockPublish xmlns="4873beb7-5857-4685-be1f-d57550cc96cc">false</BlockPublish>
+    <TPLaunchHelpLinkType xmlns="4873beb7-5857-4685-be1f-d57550cc96cc">Template</TPLaunchHelpLinkType>
+    <LocalizationTagsTaxHTField0 xmlns="4873beb7-5857-4685-be1f-d57550cc96cc">
+      <Terms xmlns="http://schemas.microsoft.com/office/infopath/2007/PartnerControls"/>
+    </LocalizationTagsTaxHTField0>
+    <BusinessGroup xmlns="4873beb7-5857-4685-be1f-d57550cc96cc" xsi:nil="true"/>
+    <Providers xmlns="4873beb7-5857-4685-be1f-d57550cc96cc" xsi:nil="true"/>
+    <TemplateTemplateType xmlns="4873beb7-5857-4685-be1f-d57550cc96cc">PowerPoint Presentation Template</TemplateTemplateType>
+    <TimesCloned xmlns="4873beb7-5857-4685-be1f-d57550cc96cc" xsi:nil="true"/>
+    <TPAppVersion xmlns="4873beb7-5857-4685-be1f-d57550cc96cc" xsi:nil="true"/>
+    <VoteCount xmlns="4873beb7-5857-4685-be1f-d57550cc96cc" xsi:nil="true"/>
+    <AverageRating xmlns="4873beb7-5857-4685-be1f-d57550cc96cc" xsi:nil="true"/>
+    <FeatureTagsTaxHTField0 xmlns="4873beb7-5857-4685-be1f-d57550cc96cc">
+      <Terms xmlns="http://schemas.microsoft.com/office/infopath/2007/PartnerControls"/>
+    </FeatureTagsTaxHTField0>
+    <Provider xmlns="4873beb7-5857-4685-be1f-d57550cc96cc" xsi:nil="true"/>
+    <UACurrentWords xmlns="4873beb7-5857-4685-be1f-d57550cc96cc" xsi:nil="true"/>
+    <AssetId xmlns="4873beb7-5857-4685-be1f-d57550cc96cc">TP103460417</AssetId>
+    <TPClientViewer xmlns="4873beb7-5857-4685-be1f-d57550cc96cc" xsi:nil="true"/>
+    <DSATActionTaken xmlns="4873beb7-5857-4685-be1f-d57550cc96cc" xsi:nil="true"/>
+    <APEditor xmlns="4873beb7-5857-4685-be1f-d57550cc96cc">
+      <UserInfo>
+        <DisplayName/>
+        <AccountId xsi:nil="true"/>
+        <AccountType/>
+      </UserInfo>
+    </APEditor>
+    <TPInstallLocation xmlns="4873beb7-5857-4685-be1f-d57550cc96cc" xsi:nil="true"/>
+    <OOCacheId xmlns="4873beb7-5857-4685-be1f-d57550cc96cc" xsi:nil="true"/>
+    <IsDeleted xmlns="4873beb7-5857-4685-be1f-d57550cc96cc">false</IsDeleted>
+    <PublishTargets xmlns="4873beb7-5857-4685-be1f-d57550cc96cc">OfficeOnlineVNext</PublishTargets>
+    <ApprovalLog xmlns="4873beb7-5857-4685-be1f-d57550cc96cc" xsi:nil="true"/>
+    <BugNumber xmlns="4873beb7-5857-4685-be1f-d57550cc96cc" xsi:nil="true"/>
+    <CrawlForDependencies xmlns="4873beb7-5857-4685-be1f-d57550cc96cc">false</CrawlForDependencies>
+    <InternalTagsTaxHTField0 xmlns="4873beb7-5857-4685-be1f-d57550cc96cc">
+      <Terms xmlns="http://schemas.microsoft.com/office/infopath/2007/PartnerControls"/>
+    </InternalTagsTaxHTField0>
+    <LastHandOff xmlns="4873beb7-5857-4685-be1f-d57550cc96cc" xsi:nil="true"/>
+    <Milestone xmlns="4873beb7-5857-4685-be1f-d57550cc96cc" xsi:nil="true"/>
+    <OriginalRelease xmlns="4873beb7-5857-4685-be1f-d57550cc96cc">15</OriginalRelease>
+    <RecommendationsModifier xmlns="4873beb7-5857-4685-be1f-d57550cc96cc" xsi:nil="true"/>
+    <ScenarioTagsTaxHTField0 xmlns="4873beb7-5857-4685-be1f-d57550cc96cc">
+      <Terms xmlns="http://schemas.microsoft.com/office/infopath/2007/PartnerControls"/>
+    </ScenarioTagsTaxHTField0>
+    <UANotes xmlns="4873beb7-5857-4685-be1f-d57550cc96cc" xsi:nil="true"/>
+  </documentManagement>
+</p:properties>
 </file>
 
 <file path=customXml/item2.xml><?xml version="1.0" encoding="utf-8"?>
@@ -26421,135 +27214,20 @@
 </file>
 
 <file path=customXml/item3.xml><?xml version="1.0" encoding="utf-8"?>
-<p:properties xmlns:p="http://schemas.microsoft.com/office/2006/metadata/properties" xmlns:xsi="http://www.w3.org/2001/XMLSchema-instance" xmlns:pc="http://schemas.microsoft.com/office/infopath/2007/PartnerControls">
-  <documentManagement>
-    <APDescription xmlns="4873beb7-5857-4685-be1f-d57550cc96cc" xsi:nil="true"/>
-    <AssetExpire xmlns="4873beb7-5857-4685-be1f-d57550cc96cc">2029-01-01T08:00:00+00:00</AssetExpire>
-    <CampaignTagsTaxHTField0 xmlns="4873beb7-5857-4685-be1f-d57550cc96cc">
-      <Terms xmlns="http://schemas.microsoft.com/office/infopath/2007/PartnerControls"/>
-    </CampaignTagsTaxHTField0>
-    <IntlLangReviewDate xmlns="4873beb7-5857-4685-be1f-d57550cc96cc" xsi:nil="true"/>
-    <TPFriendlyName xmlns="4873beb7-5857-4685-be1f-d57550cc96cc" xsi:nil="true"/>
-    <IntlLangReview xmlns="4873beb7-5857-4685-be1f-d57550cc96cc">false</IntlLangReview>
-    <LocLastLocAttemptVersionLookup xmlns="4873beb7-5857-4685-be1f-d57550cc96cc">856783</LocLastLocAttemptVersionLookup>
-    <PolicheckWords xmlns="4873beb7-5857-4685-be1f-d57550cc96cc" xsi:nil="true"/>
-    <SubmitterId xmlns="4873beb7-5857-4685-be1f-d57550cc96cc" xsi:nil="true"/>
-    <AcquiredFrom xmlns="4873beb7-5857-4685-be1f-d57550cc96cc">Internal MS</AcquiredFrom>
-    <EditorialStatus xmlns="4873beb7-5857-4685-be1f-d57550cc96cc">Complete</EditorialStatus>
-    <Markets xmlns="4873beb7-5857-4685-be1f-d57550cc96cc"/>
-    <OriginAsset xmlns="4873beb7-5857-4685-be1f-d57550cc96cc" xsi:nil="true"/>
-    <AssetStart xmlns="4873beb7-5857-4685-be1f-d57550cc96cc">2012-09-20T10:48:20+00:00</AssetStart>
-    <FriendlyTitle xmlns="4873beb7-5857-4685-be1f-d57550cc96cc" xsi:nil="true"/>
-    <MarketSpecific xmlns="4873beb7-5857-4685-be1f-d57550cc96cc">false</MarketSpecific>
-    <TPNamespace xmlns="4873beb7-5857-4685-be1f-d57550cc96cc" xsi:nil="true"/>
-    <PublishStatusLookup xmlns="4873beb7-5857-4685-be1f-d57550cc96cc">
-      <Value>1622871</Value>
-    </PublishStatusLookup>
-    <APAuthor xmlns="4873beb7-5857-4685-be1f-d57550cc96cc">
-      <UserInfo>
-        <DisplayName>REDMOND\v-luannv</DisplayName>
-        <AccountId>92</AccountId>
-        <AccountType/>
-      </UserInfo>
-    </APAuthor>
-    <TPCommandLine xmlns="4873beb7-5857-4685-be1f-d57550cc96cc" xsi:nil="true"/>
-    <IntlLangReviewer xmlns="4873beb7-5857-4685-be1f-d57550cc96cc" xsi:nil="true"/>
-    <OpenTemplate xmlns="4873beb7-5857-4685-be1f-d57550cc96cc">true</OpenTemplate>
-    <CSXSubmissionDate xmlns="4873beb7-5857-4685-be1f-d57550cc96cc" xsi:nil="true"/>
-    <TaxCatchAll xmlns="4873beb7-5857-4685-be1f-d57550cc96cc"/>
-    <Manager xmlns="4873beb7-5857-4685-be1f-d57550cc96cc" xsi:nil="true"/>
-    <NumericId xmlns="4873beb7-5857-4685-be1f-d57550cc96cc" xsi:nil="true"/>
-    <ParentAssetId xmlns="4873beb7-5857-4685-be1f-d57550cc96cc" xsi:nil="true"/>
-    <OriginalSourceMarket xmlns="4873beb7-5857-4685-be1f-d57550cc96cc" xsi:nil="true"/>
-    <ApprovalStatus xmlns="4873beb7-5857-4685-be1f-d57550cc96cc">InProgress</ApprovalStatus>
-    <TPComponent xmlns="4873beb7-5857-4685-be1f-d57550cc96cc" xsi:nil="true"/>
-    <EditorialTags xmlns="4873beb7-5857-4685-be1f-d57550cc96cc" xsi:nil="true"/>
-    <TPExecutable xmlns="4873beb7-5857-4685-be1f-d57550cc96cc" xsi:nil="true"/>
-    <TPLaunchHelpLink xmlns="4873beb7-5857-4685-be1f-d57550cc96cc" xsi:nil="true"/>
-    <LocComments xmlns="4873beb7-5857-4685-be1f-d57550cc96cc" xsi:nil="true"/>
-    <LocRecommendedHandoff xmlns="4873beb7-5857-4685-be1f-d57550cc96cc" xsi:nil="true"/>
-    <SourceTitle xmlns="4873beb7-5857-4685-be1f-d57550cc96cc" xsi:nil="true"/>
-    <CSXUpdate xmlns="4873beb7-5857-4685-be1f-d57550cc96cc">false</CSXUpdate>
-    <IntlLocPriority xmlns="4873beb7-5857-4685-be1f-d57550cc96cc" xsi:nil="true"/>
-    <UAProjectedTotalWords xmlns="4873beb7-5857-4685-be1f-d57550cc96cc" xsi:nil="true"/>
-    <AssetType xmlns="4873beb7-5857-4685-be1f-d57550cc96cc" xsi:nil="true"/>
-    <MachineTranslated xmlns="4873beb7-5857-4685-be1f-d57550cc96cc">false</MachineTranslated>
-    <OutputCachingOn xmlns="4873beb7-5857-4685-be1f-d57550cc96cc">false</OutputCachingOn>
-    <TemplateStatus xmlns="4873beb7-5857-4685-be1f-d57550cc96cc">Complete</TemplateStatus>
-    <IsSearchable xmlns="4873beb7-5857-4685-be1f-d57550cc96cc">false</IsSearchable>
-    <ContentItem xmlns="4873beb7-5857-4685-be1f-d57550cc96cc" xsi:nil="true"/>
-    <HandoffToMSDN xmlns="4873beb7-5857-4685-be1f-d57550cc96cc" xsi:nil="true"/>
-    <ShowIn xmlns="4873beb7-5857-4685-be1f-d57550cc96cc">Show everywhere</ShowIn>
-    <ThumbnailAssetId xmlns="4873beb7-5857-4685-be1f-d57550cc96cc" xsi:nil="true"/>
-    <UALocComments xmlns="4873beb7-5857-4685-be1f-d57550cc96cc" xsi:nil="true"/>
-    <UALocRecommendation xmlns="4873beb7-5857-4685-be1f-d57550cc96cc">Localize</UALocRecommendation>
-    <LastModifiedDateTime xmlns="4873beb7-5857-4685-be1f-d57550cc96cc" xsi:nil="true"/>
-    <LegacyData xmlns="4873beb7-5857-4685-be1f-d57550cc96cc" xsi:nil="true"/>
-    <LocManualTestRequired xmlns="4873beb7-5857-4685-be1f-d57550cc96cc">false</LocManualTestRequired>
-    <LocMarketGroupTiers2 xmlns="4873beb7-5857-4685-be1f-d57550cc96cc" xsi:nil="true"/>
-    <ClipArtFilename xmlns="4873beb7-5857-4685-be1f-d57550cc96cc" xsi:nil="true"/>
-    <TPApplication xmlns="4873beb7-5857-4685-be1f-d57550cc96cc" xsi:nil="true"/>
-    <CSXHash xmlns="4873beb7-5857-4685-be1f-d57550cc96cc" xsi:nil="true"/>
-    <DirectSourceMarket xmlns="4873beb7-5857-4685-be1f-d57550cc96cc" xsi:nil="true"/>
-    <PrimaryImageGen xmlns="4873beb7-5857-4685-be1f-d57550cc96cc">true</PrimaryImageGen>
-    <PlannedPubDate xmlns="4873beb7-5857-4685-be1f-d57550cc96cc" xsi:nil="true"/>
-    <CSXSubmissionMarket xmlns="4873beb7-5857-4685-be1f-d57550cc96cc" xsi:nil="true"/>
-    <Downloads xmlns="4873beb7-5857-4685-be1f-d57550cc96cc">0</Downloads>
-    <ArtSampleDocs xmlns="4873beb7-5857-4685-be1f-d57550cc96cc" xsi:nil="true"/>
-    <TrustLevel xmlns="4873beb7-5857-4685-be1f-d57550cc96cc">1 Microsoft Managed Content</TrustLevel>
-    <BlockPublish xmlns="4873beb7-5857-4685-be1f-d57550cc96cc">false</BlockPublish>
-    <TPLaunchHelpLinkType xmlns="4873beb7-5857-4685-be1f-d57550cc96cc">Template</TPLaunchHelpLinkType>
-    <LocalizationTagsTaxHTField0 xmlns="4873beb7-5857-4685-be1f-d57550cc96cc">
-      <Terms xmlns="http://schemas.microsoft.com/office/infopath/2007/PartnerControls"/>
-    </LocalizationTagsTaxHTField0>
-    <BusinessGroup xmlns="4873beb7-5857-4685-be1f-d57550cc96cc" xsi:nil="true"/>
-    <Providers xmlns="4873beb7-5857-4685-be1f-d57550cc96cc" xsi:nil="true"/>
-    <TemplateTemplateType xmlns="4873beb7-5857-4685-be1f-d57550cc96cc">PowerPoint Presentation Template</TemplateTemplateType>
-    <TimesCloned xmlns="4873beb7-5857-4685-be1f-d57550cc96cc" xsi:nil="true"/>
-    <TPAppVersion xmlns="4873beb7-5857-4685-be1f-d57550cc96cc" xsi:nil="true"/>
-    <VoteCount xmlns="4873beb7-5857-4685-be1f-d57550cc96cc" xsi:nil="true"/>
-    <AverageRating xmlns="4873beb7-5857-4685-be1f-d57550cc96cc" xsi:nil="true"/>
-    <FeatureTagsTaxHTField0 xmlns="4873beb7-5857-4685-be1f-d57550cc96cc">
-      <Terms xmlns="http://schemas.microsoft.com/office/infopath/2007/PartnerControls"/>
-    </FeatureTagsTaxHTField0>
-    <Provider xmlns="4873beb7-5857-4685-be1f-d57550cc96cc" xsi:nil="true"/>
-    <UACurrentWords xmlns="4873beb7-5857-4685-be1f-d57550cc96cc" xsi:nil="true"/>
-    <AssetId xmlns="4873beb7-5857-4685-be1f-d57550cc96cc">TP103460417</AssetId>
-    <TPClientViewer xmlns="4873beb7-5857-4685-be1f-d57550cc96cc" xsi:nil="true"/>
-    <DSATActionTaken xmlns="4873beb7-5857-4685-be1f-d57550cc96cc" xsi:nil="true"/>
-    <APEditor xmlns="4873beb7-5857-4685-be1f-d57550cc96cc">
-      <UserInfo>
-        <DisplayName/>
-        <AccountId xsi:nil="true"/>
-        <AccountType/>
-      </UserInfo>
-    </APEditor>
-    <TPInstallLocation xmlns="4873beb7-5857-4685-be1f-d57550cc96cc" xsi:nil="true"/>
-    <OOCacheId xmlns="4873beb7-5857-4685-be1f-d57550cc96cc" xsi:nil="true"/>
-    <IsDeleted xmlns="4873beb7-5857-4685-be1f-d57550cc96cc">false</IsDeleted>
-    <PublishTargets xmlns="4873beb7-5857-4685-be1f-d57550cc96cc">OfficeOnlineVNext</PublishTargets>
-    <ApprovalLog xmlns="4873beb7-5857-4685-be1f-d57550cc96cc" xsi:nil="true"/>
-    <BugNumber xmlns="4873beb7-5857-4685-be1f-d57550cc96cc" xsi:nil="true"/>
-    <CrawlForDependencies xmlns="4873beb7-5857-4685-be1f-d57550cc96cc">false</CrawlForDependencies>
-    <InternalTagsTaxHTField0 xmlns="4873beb7-5857-4685-be1f-d57550cc96cc">
-      <Terms xmlns="http://schemas.microsoft.com/office/infopath/2007/PartnerControls"/>
-    </InternalTagsTaxHTField0>
-    <LastHandOff xmlns="4873beb7-5857-4685-be1f-d57550cc96cc" xsi:nil="true"/>
-    <Milestone xmlns="4873beb7-5857-4685-be1f-d57550cc96cc" xsi:nil="true"/>
-    <OriginalRelease xmlns="4873beb7-5857-4685-be1f-d57550cc96cc">15</OriginalRelease>
-    <RecommendationsModifier xmlns="4873beb7-5857-4685-be1f-d57550cc96cc" xsi:nil="true"/>
-    <ScenarioTagsTaxHTField0 xmlns="4873beb7-5857-4685-be1f-d57550cc96cc">
-      <Terms xmlns="http://schemas.microsoft.com/office/infopath/2007/PartnerControls"/>
-    </ScenarioTagsTaxHTField0>
-    <UANotes xmlns="4873beb7-5857-4685-be1f-d57550cc96cc" xsi:nil="true"/>
-  </documentManagement>
-</p:properties>
+<?mso-contentType ?>
+<FormTemplates xmlns="http://schemas.microsoft.com/sharepoint/v3/contenttype/forms">
+  <Display>DocumentLibraryForm</Display>
+  <Edit>AssetEditForm</Edit>
+  <New>DocumentLibraryForm</New>
+</FormTemplates>
 </file>
 
 <file path=customXml/itemProps1.xml><?xml version="1.0" encoding="utf-8"?>
-<ds:datastoreItem xmlns:ds="http://schemas.openxmlformats.org/officeDocument/2006/customXml" ds:itemID="{100AC149-8447-4BE5-88C7-DBE24EA73E83}">
+<ds:datastoreItem xmlns:ds="http://schemas.openxmlformats.org/officeDocument/2006/customXml" ds:itemID="{D0D1C9B0-FE26-433B-8E1A-54CCDFA4EB1D}">
   <ds:schemaRefs>
-    <ds:schemaRef ds:uri="http://schemas.microsoft.com/sharepoint/v3/contenttype/forms"/>
+    <ds:schemaRef ds:uri="http://schemas.microsoft.com/office/2006/metadata/properties"/>
+    <ds:schemaRef ds:uri="http://schemas.microsoft.com/office/infopath/2007/PartnerControls"/>
+    <ds:schemaRef ds:uri="4873beb7-5857-4685-be1f-d57550cc96cc"/>
   </ds:schemaRefs>
 </ds:datastoreItem>
 </file>
@@ -26573,11 +27251,9 @@
 </file>
 
 <file path=customXml/itemProps3.xml><?xml version="1.0" encoding="utf-8"?>
-<ds:datastoreItem xmlns:ds="http://schemas.openxmlformats.org/officeDocument/2006/customXml" ds:itemID="{D0D1C9B0-FE26-433B-8E1A-54CCDFA4EB1D}">
+<ds:datastoreItem xmlns:ds="http://schemas.openxmlformats.org/officeDocument/2006/customXml" ds:itemID="{100AC149-8447-4BE5-88C7-DBE24EA73E83}">
   <ds:schemaRefs>
-    <ds:schemaRef ds:uri="http://schemas.microsoft.com/office/2006/metadata/properties"/>
-    <ds:schemaRef ds:uri="http://schemas.microsoft.com/office/infopath/2007/PartnerControls"/>
-    <ds:schemaRef ds:uri="4873beb7-5857-4685-be1f-d57550cc96cc"/>
+    <ds:schemaRef ds:uri="http://schemas.microsoft.com/sharepoint/v3/contenttype/forms"/>
   </ds:schemaRefs>
 </ds:datastoreItem>
 </file>
</xml_diff>